<commit_message>
adjust logistic regression lesson
</commit_message>
<xml_diff>
--- a/Lessons/E_LogReg/E_LogReg.pptx
+++ b/Lessons/E_LogReg/E_LogReg.pptx
@@ -230,7 +230,7 @@
           <a:p>
             <a:fld id="{B0C0A60C-850A-4EA4-9C14-A8FE98B94505}" type="datetimeFigureOut">
               <a:rPr lang="en-US" smtClean="0"/>
-              <a:t>10/4/20</a:t>
+              <a:t>10/4/21</a:t>
             </a:fld>
             <a:endParaRPr lang="en-US"/>
           </a:p>
@@ -1131,7 +1131,7 @@
           <a:p>
             <a:fld id="{5738B90E-0779-4C36-915C-6F05FCD89456}" type="datetime1">
               <a:rPr lang="en-US" smtClean="0"/>
-              <a:t>10/4/20</a:t>
+              <a:t>10/4/21</a:t>
             </a:fld>
             <a:endParaRPr lang="en-US"/>
           </a:p>
@@ -1349,7 +1349,7 @@
           <a:p>
             <a:fld id="{7B9EA29D-D431-42FE-B7B6-AAE4454C77D3}" type="datetime1">
               <a:rPr lang="en-US" smtClean="0"/>
-              <a:t>10/4/20</a:t>
+              <a:t>10/4/21</a:t>
             </a:fld>
             <a:endParaRPr lang="en-US"/>
           </a:p>
@@ -1609,7 +1609,7 @@
           <a:p>
             <a:fld id="{690D8A1E-EA8F-46C1-B891-AE0C00D9C314}" type="datetime1">
               <a:rPr lang="en-US" smtClean="0"/>
-              <a:t>10/4/20</a:t>
+              <a:t>10/4/21</a:t>
             </a:fld>
             <a:endParaRPr lang="en-US"/>
           </a:p>
@@ -1903,7 +1903,7 @@
           <a:p>
             <a:fld id="{D753EFC8-4232-4598-94F6-94C0EBAFC469}" type="datetime1">
               <a:rPr lang="en-US" smtClean="0"/>
-              <a:t>10/4/20</a:t>
+              <a:t>10/4/21</a:t>
             </a:fld>
             <a:endParaRPr lang="en-US"/>
           </a:p>
@@ -2218,7 +2218,7 @@
           <a:p>
             <a:fld id="{F3161074-1C18-4AE7-957D-F18524378C85}" type="datetime1">
               <a:rPr lang="en-US" smtClean="0"/>
-              <a:t>10/4/20</a:t>
+              <a:t>10/4/21</a:t>
             </a:fld>
             <a:endParaRPr lang="en-US"/>
           </a:p>
@@ -2492,7 +2492,7 @@
           <a:p>
             <a:fld id="{69BE256C-8D9A-4404-B47D-41A1AE514425}" type="datetime1">
               <a:rPr lang="en-US" smtClean="0"/>
-              <a:t>10/4/20</a:t>
+              <a:t>10/4/21</a:t>
             </a:fld>
             <a:endParaRPr lang="en-US"/>
           </a:p>
@@ -2926,7 +2926,7 @@
           <a:p>
             <a:fld id="{66CB2154-9035-4012-8189-BAAB61C5A5EE}" type="datetime1">
               <a:rPr lang="en-US" smtClean="0"/>
-              <a:t>10/4/20</a:t>
+              <a:t>10/4/21</a:t>
             </a:fld>
             <a:endParaRPr lang="en-US"/>
           </a:p>
@@ -3100,7 +3100,7 @@
           <a:p>
             <a:fld id="{6700A58B-DD98-43D0-B791-721480A02982}" type="datetime1">
               <a:rPr lang="en-US" smtClean="0"/>
-              <a:t>10/4/20</a:t>
+              <a:t>10/4/21</a:t>
             </a:fld>
             <a:endParaRPr lang="en-US"/>
           </a:p>
@@ -3292,7 +3292,7 @@
           <a:p>
             <a:fld id="{7DB6E382-4F61-4E24-BE1A-377EC83D0E3A}" type="datetime1">
               <a:rPr lang="en-US" smtClean="0"/>
-              <a:t>10/4/20</a:t>
+              <a:t>10/4/21</a:t>
             </a:fld>
             <a:endParaRPr lang="en-US"/>
           </a:p>
@@ -3603,7 +3603,7 @@
           <a:p>
             <a:fld id="{4142EED6-FC16-45B9-B8C4-2BC5DBA88325}" type="datetime1">
               <a:rPr lang="en-US" smtClean="0"/>
-              <a:t>10/4/20</a:t>
+              <a:t>10/4/21</a:t>
             </a:fld>
             <a:endParaRPr lang="en-US"/>
           </a:p>
@@ -3921,7 +3921,7 @@
           <a:p>
             <a:fld id="{DF59512B-4F1D-43D7-8819-2F53FEF69650}" type="datetime1">
               <a:rPr lang="en-US" smtClean="0"/>
-              <a:t>10/4/20</a:t>
+              <a:t>10/4/21</a:t>
             </a:fld>
             <a:endParaRPr lang="en-US"/>
           </a:p>
@@ -4197,7 +4197,7 @@
           <a:p>
             <a:fld id="{08437B94-E2BF-44DC-ADC5-B05FC9934E9D}" type="datetime1">
               <a:rPr lang="en-US" smtClean="0"/>
-              <a:t>10/4/20</a:t>
+              <a:t>10/4/21</a:t>
             </a:fld>
             <a:endParaRPr lang="en-US"/>
           </a:p>
@@ -5283,7 +5283,7 @@
           <a:p>
             <a:fld id="{9B19E99B-5349-415A-8E56-8E989211A366}" type="datetime1">
               <a:rPr lang="en-US" smtClean="0"/>
-              <a:t>10/4/20</a:t>
+              <a:t>10/4/21</a:t>
             </a:fld>
             <a:endParaRPr lang="en-US"/>
           </a:p>
@@ -5381,7 +5381,7 @@
           <a:p>
             <a:fld id="{6700A58B-DD98-43D0-B791-721480A02982}" type="datetime1">
               <a:rPr lang="en-US" smtClean="0"/>
-              <a:t>10/4/20</a:t>
+              <a:t>10/4/21</a:t>
             </a:fld>
             <a:endParaRPr lang="en-US"/>
           </a:p>
@@ -5700,7 +5700,7 @@
           <a:p>
             <a:fld id="{6700A58B-DD98-43D0-B791-721480A02982}" type="datetime1">
               <a:rPr lang="en-US" smtClean="0"/>
-              <a:t>10/4/20</a:t>
+              <a:t>10/4/21</a:t>
             </a:fld>
             <a:endParaRPr lang="en-US"/>
           </a:p>
@@ -6132,7 +6132,7 @@
           <a:p>
             <a:fld id="{6700A58B-DD98-43D0-B791-721480A02982}" type="datetime1">
               <a:rPr lang="en-US" smtClean="0"/>
-              <a:t>10/4/20</a:t>
+              <a:t>10/4/21</a:t>
             </a:fld>
             <a:endParaRPr lang="en-US"/>
           </a:p>
@@ -6644,7 +6644,7 @@
           <a:p>
             <a:fld id="{6700A58B-DD98-43D0-B791-721480A02982}" type="datetime1">
               <a:rPr lang="en-US" smtClean="0"/>
-              <a:t>10/4/20</a:t>
+              <a:t>10/4/21</a:t>
             </a:fld>
             <a:endParaRPr lang="en-US"/>
           </a:p>
@@ -6826,7 +6826,7 @@
           <a:p>
             <a:fld id="{6700A58B-DD98-43D0-B791-721480A02982}" type="datetime1">
               <a:rPr lang="en-US" smtClean="0"/>
-              <a:t>10/4/20</a:t>
+              <a:t>10/4/21</a:t>
             </a:fld>
             <a:endParaRPr lang="en-US"/>
           </a:p>
@@ -6886,7 +6886,7 @@
         <p:spPr>
           <a:xfrm>
             <a:off x="577515" y="1459832"/>
-            <a:ext cx="5982600" cy="523220"/>
+            <a:ext cx="4708084" cy="523220"/>
           </a:xfrm>
           <a:prstGeom prst="rect">
             <a:avLst/>
@@ -6905,7 +6905,7 @@
             </a:r>
             <a:r>
               <a:rPr lang="en-US" sz="2800" b="1" dirty="0" err="1"/>
-              <a:t>B_fullyMarchMadnessREVISED.R</a:t>
+              <a:t>B_fullyMarchMadness.R</a:t>
             </a:r>
             <a:endParaRPr lang="en-US" sz="2800" b="1" dirty="0"/>
           </a:p>
@@ -7032,7 +7032,7 @@
           <a:p>
             <a:fld id="{6700A58B-DD98-43D0-B791-721480A02982}" type="datetime1">
               <a:rPr lang="en-US" smtClean="0"/>
-              <a:t>10/4/20</a:t>
+              <a:t>10/4/21</a:t>
             </a:fld>
             <a:endParaRPr lang="en-US"/>
           </a:p>
@@ -7348,7 +7348,7 @@
           <a:p>
             <a:fld id="{6700A58B-DD98-43D0-B791-721480A02982}" type="datetime1">
               <a:rPr lang="en-US" smtClean="0"/>
-              <a:t>10/4/20</a:t>
+              <a:t>10/4/21</a:t>
             </a:fld>
             <a:endParaRPr lang="en-US"/>
           </a:p>
@@ -7837,7 +7837,7 @@
           <a:p>
             <a:fld id="{6700A58B-DD98-43D0-B791-721480A02982}" type="datetime1">
               <a:rPr lang="en-US" smtClean="0"/>
-              <a:t>10/4/20</a:t>
+              <a:t>10/4/21</a:t>
             </a:fld>
             <a:endParaRPr lang="en-US"/>
           </a:p>
@@ -9237,7 +9237,7 @@
           <a:p>
             <a:fld id="{6700A58B-DD98-43D0-B791-721480A02982}" type="datetime1">
               <a:rPr lang="en-US" smtClean="0"/>
-              <a:t>10/4/20</a:t>
+              <a:t>10/4/21</a:t>
             </a:fld>
             <a:endParaRPr lang="en-US"/>
           </a:p>
@@ -10011,7 +10011,7 @@
           <a:p>
             <a:fld id="{6700A58B-DD98-43D0-B791-721480A02982}" type="datetime1">
               <a:rPr lang="en-US" smtClean="0"/>
-              <a:t>10/4/20</a:t>
+              <a:t>10/4/21</a:t>
             </a:fld>
             <a:endParaRPr lang="en-US"/>
           </a:p>
@@ -11848,7 +11848,7 @@
           <a:p>
             <a:fld id="{6700A58B-DD98-43D0-B791-721480A02982}" type="datetime1">
               <a:rPr lang="en-US" smtClean="0"/>
-              <a:t>10/4/20</a:t>
+              <a:t>10/4/21</a:t>
             </a:fld>
             <a:endParaRPr lang="en-US"/>
           </a:p>
@@ -13076,7 +13076,7 @@
           <a:p>
             <a:fld id="{6700A58B-DD98-43D0-B791-721480A02982}" type="datetime1">
               <a:rPr lang="en-US" smtClean="0"/>
-              <a:t>10/4/20</a:t>
+              <a:t>10/4/21</a:t>
             </a:fld>
             <a:endParaRPr lang="en-US"/>
           </a:p>
@@ -13964,7 +13964,7 @@
           <a:p>
             <a:fld id="{6700A58B-DD98-43D0-B791-721480A02982}" type="datetime1">
               <a:rPr lang="en-US" smtClean="0"/>
-              <a:t>10/4/20</a:t>
+              <a:t>10/4/21</a:t>
             </a:fld>
             <a:endParaRPr lang="en-US"/>
           </a:p>
@@ -14382,7 +14382,7 @@
           <a:p>
             <a:fld id="{6700A58B-DD98-43D0-B791-721480A02982}" type="datetime1">
               <a:rPr lang="en-US" smtClean="0"/>
-              <a:t>10/4/20</a:t>
+              <a:t>10/4/21</a:t>
             </a:fld>
             <a:endParaRPr lang="en-US"/>
           </a:p>
@@ -14442,7 +14442,7 @@
         <p:spPr>
           <a:xfrm>
             <a:off x="577515" y="1459832"/>
-            <a:ext cx="5982600" cy="523220"/>
+            <a:ext cx="4708084" cy="523220"/>
           </a:xfrm>
           <a:prstGeom prst="rect">
             <a:avLst/>
@@ -14461,7 +14461,7 @@
             </a:r>
             <a:r>
               <a:rPr lang="en-US" sz="2800" b="1" dirty="0" err="1"/>
-              <a:t>B_fullyMarchMadnessREVISED.R</a:t>
+              <a:t>B_fullyMarchMadness.R</a:t>
             </a:r>
             <a:endParaRPr lang="en-US" sz="2800" b="1" dirty="0"/>
           </a:p>
@@ -14571,7 +14571,7 @@
           <a:p>
             <a:fld id="{6700A58B-DD98-43D0-B791-721480A02982}" type="datetime1">
               <a:rPr lang="en-US" smtClean="0"/>
-              <a:t>10/4/20</a:t>
+              <a:t>10/4/21</a:t>
             </a:fld>
             <a:endParaRPr lang="en-US"/>
           </a:p>
@@ -15146,7 +15146,7 @@
           <a:p>
             <a:fld id="{6700A58B-DD98-43D0-B791-721480A02982}" type="datetime1">
               <a:rPr lang="en-US" smtClean="0"/>
-              <a:t>10/4/20</a:t>
+              <a:t>10/4/21</a:t>
             </a:fld>
             <a:endParaRPr lang="en-US"/>
           </a:p>
@@ -16012,7 +16012,7 @@
           <a:p>
             <a:fld id="{6700A58B-DD98-43D0-B791-721480A02982}" type="datetime1">
               <a:rPr lang="en-US" smtClean="0"/>
-              <a:t>10/4/20</a:t>
+              <a:t>10/4/21</a:t>
             </a:fld>
             <a:endParaRPr lang="en-US"/>
           </a:p>
@@ -16166,7 +16166,7 @@
           <a:p>
             <a:fld id="{6700A58B-DD98-43D0-B791-721480A02982}" type="datetime1">
               <a:rPr lang="en-US" smtClean="0"/>
-              <a:t>10/4/20</a:t>
+              <a:t>10/4/21</a:t>
             </a:fld>
             <a:endParaRPr lang="en-US"/>
           </a:p>
@@ -17264,7 +17264,7 @@
           <a:p>
             <a:fld id="{6700A58B-DD98-43D0-B791-721480A02982}" type="datetime1">
               <a:rPr lang="en-US" smtClean="0"/>
-              <a:t>10/4/20</a:t>
+              <a:t>10/4/21</a:t>
             </a:fld>
             <a:endParaRPr lang="en-US"/>
           </a:p>
@@ -17371,7 +17371,7 @@
         <p:spPr>
           <a:xfrm>
             <a:off x="573024" y="1548384"/>
-            <a:ext cx="2499339" cy="369332"/>
+            <a:ext cx="2624373" cy="369332"/>
           </a:xfrm>
           <a:prstGeom prst="rect">
             <a:avLst/>
@@ -17390,7 +17390,7 @@
             </a:r>
             <a:r>
               <a:rPr lang="en-US" dirty="0" err="1"/>
-              <a:t>A_lm_for</a:t>
+              <a:t>AB_lm_for</a:t>
             </a:r>
             <a:r>
               <a:rPr lang="en-US" dirty="0"/>
@@ -17451,7 +17451,7 @@
           <a:p>
             <a:fld id="{6700A58B-DD98-43D0-B791-721480A02982}" type="datetime1">
               <a:rPr lang="en-US" smtClean="0"/>
-              <a:t>10/4/20</a:t>
+              <a:t>10/4/21</a:t>
             </a:fld>
             <a:endParaRPr lang="en-US"/>
           </a:p>

</xml_diff>